<commit_message>
removed outliers from dataset
</commit_message>
<xml_diff>
--- a/Can you predict diabetes.pptx
+++ b/Can you predict diabetes.pptx
@@ -5,24 +5,25 @@
     <p:sldMasterId id="2147483648" r:id="rId4"/>
   </p:sldMasterIdLst>
   <p:notesMasterIdLst>
-    <p:notesMasterId r:id="rId17"/>
+    <p:notesMasterId r:id="rId18"/>
   </p:notesMasterIdLst>
   <p:handoutMasterIdLst>
-    <p:handoutMasterId r:id="rId18"/>
+    <p:handoutMasterId r:id="rId19"/>
   </p:handoutMasterIdLst>
   <p:sldIdLst>
     <p:sldId id="256" r:id="rId5"/>
     <p:sldId id="277" r:id="rId6"/>
     <p:sldId id="278" r:id="rId7"/>
-    <p:sldId id="279" r:id="rId8"/>
-    <p:sldId id="280" r:id="rId9"/>
-    <p:sldId id="281" r:id="rId10"/>
-    <p:sldId id="282" r:id="rId11"/>
-    <p:sldId id="283" r:id="rId12"/>
-    <p:sldId id="284" r:id="rId13"/>
-    <p:sldId id="285" r:id="rId14"/>
-    <p:sldId id="286" r:id="rId15"/>
-    <p:sldId id="287" r:id="rId16"/>
+    <p:sldId id="288" r:id="rId8"/>
+    <p:sldId id="279" r:id="rId9"/>
+    <p:sldId id="280" r:id="rId10"/>
+    <p:sldId id="281" r:id="rId11"/>
+    <p:sldId id="282" r:id="rId12"/>
+    <p:sldId id="283" r:id="rId13"/>
+    <p:sldId id="284" r:id="rId14"/>
+    <p:sldId id="285" r:id="rId15"/>
+    <p:sldId id="286" r:id="rId16"/>
+    <p:sldId id="287" r:id="rId17"/>
   </p:sldIdLst>
   <p:sldSz cx="12192000" cy="6858000"/>
   <p:notesSz cx="6858000" cy="9144000"/>
@@ -254,7 +255,7 @@
           <a:p>
             <a:fld id="{058ABBF3-49A8-4B3F-9773-22E67695BB12}" type="datetimeFigureOut">
               <a:rPr lang="en-US" smtClean="0"/>
-              <a:t>4/27/2025</a:t>
+              <a:t>4/29/2025</a:t>
             </a:fld>
             <a:endParaRPr lang="en-US" dirty="0"/>
           </a:p>
@@ -431,7 +432,7 @@
           <a:p>
             <a:fld id="{F44AAC2B-A50D-4386-849A-6B59FB991B4C}" type="datetimeFigureOut">
               <a:rPr lang="en-US" smtClean="0"/>
-              <a:t>4/27/2025</a:t>
+              <a:t>4/29/2025</a:t>
             </a:fld>
             <a:endParaRPr lang="en-US" dirty="0"/>
           </a:p>
@@ -20036,7 +20037,46 @@
           <a:p>
             <a:r>
               <a:rPr lang="en-US" dirty="0"/>
-              <a:t>Can you predict diabetes?</a:t>
+              <a:t>Diabetes Prediction using ML</a:t>
+            </a:r>
+          </a:p>
+        </p:txBody>
+      </p:sp>
+      <p:sp>
+        <p:nvSpPr>
+          <p:cNvPr id="3" name="TextBox 2">
+            <a:extLst>
+              <a:ext uri="{FF2B5EF4-FFF2-40B4-BE49-F238E27FC236}">
+                <a16:creationId xmlns:a16="http://schemas.microsoft.com/office/drawing/2014/main" id="{4D0EB08D-F857-ABF4-A49A-8307B670CADE}"/>
+              </a:ext>
+            </a:extLst>
+          </p:cNvPr>
+          <p:cNvSpPr txBox="1"/>
+          <p:nvPr/>
+        </p:nvSpPr>
+        <p:spPr>
+          <a:xfrm>
+            <a:off x="4714772" y="4129873"/>
+            <a:ext cx="5225143" cy="369332"/>
+          </a:xfrm>
+          <a:prstGeom prst="rect">
+            <a:avLst/>
+          </a:prstGeom>
+          <a:noFill/>
+        </p:spPr>
+        <p:txBody>
+          <a:bodyPr wrap="square" rtlCol="0">
+            <a:spAutoFit/>
+          </a:bodyPr>
+          <a:lstStyle/>
+          <a:p>
+            <a:r>
+              <a:rPr lang="en-US" dirty="0">
+                <a:solidFill>
+                  <a:schemeClr val="bg1"/>
+                </a:solidFill>
+              </a:rPr>
+              <a:t>Abhimaan Mayadam</a:t>
             </a:r>
           </a:p>
         </p:txBody>
@@ -20055,6 +20095,110 @@
 </file>
 
 <file path=ppt/slides/slide10.xml><?xml version="1.0" encoding="utf-8"?>
+<p:sld xmlns:a="http://schemas.openxmlformats.org/drawingml/2006/main" xmlns:r="http://schemas.openxmlformats.org/officeDocument/2006/relationships" xmlns:p="http://schemas.openxmlformats.org/presentationml/2006/main">
+  <p:cSld>
+    <p:spTree>
+      <p:nvGrpSpPr>
+        <p:cNvPr id="1" name=""/>
+        <p:cNvGrpSpPr/>
+        <p:nvPr/>
+      </p:nvGrpSpPr>
+      <p:grpSpPr>
+        <a:xfrm>
+          <a:off x="0" y="0"/>
+          <a:ext cx="0" cy="0"/>
+          <a:chOff x="0" y="0"/>
+          <a:chExt cx="0" cy="0"/>
+        </a:xfrm>
+      </p:grpSpPr>
+      <p:sp>
+        <p:nvSpPr>
+          <p:cNvPr id="4" name="Title 3">
+            <a:extLst>
+              <a:ext uri="{FF2B5EF4-FFF2-40B4-BE49-F238E27FC236}">
+                <a16:creationId xmlns:a16="http://schemas.microsoft.com/office/drawing/2014/main" id="{D747612E-E853-BA2D-E681-3D6861E15FE0}"/>
+              </a:ext>
+            </a:extLst>
+          </p:cNvPr>
+          <p:cNvSpPr>
+            <a:spLocks noGrp="1"/>
+          </p:cNvSpPr>
+          <p:nvPr>
+            <p:ph type="title"/>
+          </p:nvPr>
+        </p:nvSpPr>
+        <p:spPr/>
+        <p:txBody>
+          <a:bodyPr/>
+          <a:lstStyle/>
+          <a:p>
+            <a:r>
+              <a:rPr lang="en-US" dirty="0"/>
+              <a:t>Machine Learning</a:t>
+            </a:r>
+          </a:p>
+        </p:txBody>
+      </p:sp>
+      <p:sp>
+        <p:nvSpPr>
+          <p:cNvPr id="5" name="Content Placeholder 4">
+            <a:extLst>
+              <a:ext uri="{FF2B5EF4-FFF2-40B4-BE49-F238E27FC236}">
+                <a16:creationId xmlns:a16="http://schemas.microsoft.com/office/drawing/2014/main" id="{09A8076E-0A6B-A573-3ECD-F35CB9B1DCA3}"/>
+              </a:ext>
+            </a:extLst>
+          </p:cNvPr>
+          <p:cNvSpPr>
+            <a:spLocks noGrp="1"/>
+          </p:cNvSpPr>
+          <p:nvPr>
+            <p:ph sz="half" idx="14"/>
+          </p:nvPr>
+        </p:nvSpPr>
+        <p:spPr/>
+        <p:txBody>
+          <a:bodyPr/>
+          <a:lstStyle/>
+          <a:p>
+            <a:r>
+              <a:rPr lang="en-US" dirty="0"/>
+              <a:t>Models Chosen:</a:t>
+            </a:r>
+          </a:p>
+          <a:p>
+            <a:r>
+              <a:rPr lang="en-US" dirty="0"/>
+              <a:t>Naïve Bayes</a:t>
+            </a:r>
+          </a:p>
+          <a:p>
+            <a:r>
+              <a:rPr lang="en-US" dirty="0"/>
+              <a:t>Decision Tree</a:t>
+            </a:r>
+          </a:p>
+          <a:p>
+            <a:r>
+              <a:rPr lang="en-US" dirty="0"/>
+              <a:t>	Untuned and Tuned</a:t>
+            </a:r>
+          </a:p>
+        </p:txBody>
+      </p:sp>
+    </p:spTree>
+    <p:extLst>
+      <p:ext uri="{BB962C8B-B14F-4D97-AF65-F5344CB8AC3E}">
+        <p14:creationId xmlns:p14="http://schemas.microsoft.com/office/powerpoint/2010/main" val="1077781537"/>
+      </p:ext>
+    </p:extLst>
+  </p:cSld>
+  <p:clrMapOvr>
+    <a:masterClrMapping/>
+  </p:clrMapOvr>
+</p:sld>
+</file>
+
+<file path=ppt/slides/slide11.xml><?xml version="1.0" encoding="utf-8"?>
 <p:sld xmlns:a="http://schemas.openxmlformats.org/drawingml/2006/main" xmlns:r="http://schemas.openxmlformats.org/officeDocument/2006/relationships" xmlns:p="http://schemas.openxmlformats.org/presentationml/2006/main">
   <p:cSld>
     <p:spTree>
@@ -20136,25 +20280,25 @@
           <a:p>
             <a:r>
               <a:rPr lang="en-US" dirty="0"/>
-              <a:t>Accuracy: 0.714</a:t>
+              <a:t>Accuracy: 0.750</a:t>
             </a:r>
           </a:p>
           <a:p>
             <a:r>
               <a:rPr lang="en-US" dirty="0"/>
-              <a:t>Precision: 0.586</a:t>
+              <a:t>Precision: 0.642</a:t>
             </a:r>
           </a:p>
           <a:p>
             <a:r>
               <a:rPr lang="en-US" dirty="0"/>
-              <a:t>Recall: 0.612</a:t>
+              <a:t>Recall: 0.642</a:t>
             </a:r>
           </a:p>
           <a:p>
             <a:r>
               <a:rPr lang="en-US" dirty="0"/>
-              <a:t>F1 Score: 0.599</a:t>
+              <a:t>F1 Score: 0.642</a:t>
             </a:r>
           </a:p>
         </p:txBody>
@@ -20183,7 +20327,7 @@
             <a:fld id="{B5CEABB6-07DC-46E8-9B57-56EC44A396E5}" type="slidenum">
               <a:rPr lang="en-US" smtClean="0"/>
               <a:pPr/>
-              <a:t>10</a:t>
+              <a:t>11</a:t>
             </a:fld>
             <a:endParaRPr lang="en-US" dirty="0"/>
           </a:p>
@@ -20249,7 +20393,7 @@
 </p:sld>
 </file>
 
-<file path=ppt/slides/slide11.xml><?xml version="1.0" encoding="utf-8"?>
+<file path=ppt/slides/slide12.xml><?xml version="1.0" encoding="utf-8"?>
 <p:sld xmlns:a="http://schemas.openxmlformats.org/drawingml/2006/main" xmlns:r="http://schemas.openxmlformats.org/officeDocument/2006/relationships" xmlns:p="http://schemas.openxmlformats.org/presentationml/2006/main">
   <p:cSld>
     <p:spTree>
@@ -20378,7 +20522,7 @@
             <a:fld id="{B5CEABB6-07DC-46E8-9B57-56EC44A396E5}" type="slidenum">
               <a:rPr lang="en-US" smtClean="0"/>
               <a:pPr/>
-              <a:t>11</a:t>
+              <a:t>12</a:t>
             </a:fld>
             <a:endParaRPr lang="en-US" dirty="0"/>
           </a:p>
@@ -20444,7 +20588,7 @@
 </p:sld>
 </file>
 
-<file path=ppt/slides/slide12.xml><?xml version="1.0" encoding="utf-8"?>
+<file path=ppt/slides/slide13.xml><?xml version="1.0" encoding="utf-8"?>
 <p:sld xmlns:a="http://schemas.openxmlformats.org/drawingml/2006/main" xmlns:r="http://schemas.openxmlformats.org/officeDocument/2006/relationships" xmlns:p="http://schemas.openxmlformats.org/presentationml/2006/main">
   <p:cSld>
     <p:spTree>
@@ -20579,7 +20723,7 @@
             <a:fld id="{B5CEABB6-07DC-46E8-9B57-56EC44A396E5}" type="slidenum">
               <a:rPr lang="en-US" smtClean="0"/>
               <a:pPr/>
-              <a:t>12</a:t>
+              <a:t>13</a:t>
             </a:fld>
             <a:endParaRPr lang="en-US" dirty="0"/>
           </a:p>
@@ -20840,7 +20984,7 @@
           <a:p>
             <a:r>
               <a:rPr lang="en-US" dirty="0"/>
-              <a:t>Diabetes</a:t>
+              <a:t>Introduction</a:t>
             </a:r>
           </a:p>
         </p:txBody>
@@ -20868,13 +21012,13 @@
           <a:p>
             <a:r>
               <a:rPr lang="en-US" dirty="0"/>
-              <a:t>Affects a large number of people all over the world</a:t>
+              <a:t>Diabetes affects a large portion of the world</a:t>
             </a:r>
           </a:p>
           <a:p>
             <a:r>
               <a:rPr lang="en-US" dirty="0"/>
-              <a:t>Focusing largely on Type 2 Diabetes</a:t>
+              <a:t>Both as a direct disease and the increased risks to health</a:t>
             </a:r>
           </a:p>
         </p:txBody>
@@ -20923,6 +21067,122 @@
 </file>
 
 <file path=ppt/slides/slide4.xml><?xml version="1.0" encoding="utf-8"?>
+<p:sld xmlns:a="http://schemas.openxmlformats.org/drawingml/2006/main" xmlns:r="http://schemas.openxmlformats.org/officeDocument/2006/relationships" xmlns:p="http://schemas.openxmlformats.org/presentationml/2006/main">
+  <p:cSld>
+    <p:spTree>
+      <p:nvGrpSpPr>
+        <p:cNvPr id="1" name=""/>
+        <p:cNvGrpSpPr/>
+        <p:nvPr/>
+      </p:nvGrpSpPr>
+      <p:grpSpPr>
+        <a:xfrm>
+          <a:off x="0" y="0"/>
+          <a:ext cx="0" cy="0"/>
+          <a:chOff x="0" y="0"/>
+          <a:chExt cx="0" cy="0"/>
+        </a:xfrm>
+      </p:grpSpPr>
+      <p:sp>
+        <p:nvSpPr>
+          <p:cNvPr id="2" name="Title 1">
+            <a:extLst>
+              <a:ext uri="{FF2B5EF4-FFF2-40B4-BE49-F238E27FC236}">
+                <a16:creationId xmlns:a16="http://schemas.microsoft.com/office/drawing/2014/main" id="{3541118E-0B93-7F48-DB4E-EB13C2F951C5}"/>
+              </a:ext>
+            </a:extLst>
+          </p:cNvPr>
+          <p:cNvSpPr>
+            <a:spLocks noGrp="1"/>
+          </p:cNvSpPr>
+          <p:nvPr>
+            <p:ph type="title"/>
+          </p:nvPr>
+        </p:nvSpPr>
+        <p:spPr/>
+        <p:txBody>
+          <a:bodyPr/>
+          <a:lstStyle/>
+          <a:p>
+            <a:r>
+              <a:rPr lang="en-US" dirty="0"/>
+              <a:t>Diabetes Diagnosis using ML</a:t>
+            </a:r>
+          </a:p>
+        </p:txBody>
+      </p:sp>
+      <p:sp>
+        <p:nvSpPr>
+          <p:cNvPr id="3" name="Content Placeholder 2">
+            <a:extLst>
+              <a:ext uri="{FF2B5EF4-FFF2-40B4-BE49-F238E27FC236}">
+                <a16:creationId xmlns:a16="http://schemas.microsoft.com/office/drawing/2014/main" id="{E082212E-6D1A-CBD1-360E-B86127EE9BFC}"/>
+              </a:ext>
+            </a:extLst>
+          </p:cNvPr>
+          <p:cNvSpPr>
+            <a:spLocks noGrp="1"/>
+          </p:cNvSpPr>
+          <p:nvPr>
+            <p:ph sz="half" idx="14"/>
+          </p:nvPr>
+        </p:nvSpPr>
+        <p:spPr/>
+        <p:txBody>
+          <a:bodyPr/>
+          <a:lstStyle/>
+          <a:p>
+            <a:r>
+              <a:rPr lang="en-US" dirty="0"/>
+              <a:t>My term project is focusing on the diagnosis and trying to predict diabetes using machine learning.</a:t>
+            </a:r>
+          </a:p>
+        </p:txBody>
+      </p:sp>
+      <p:sp>
+        <p:nvSpPr>
+          <p:cNvPr id="4" name="Slide Number Placeholder 3">
+            <a:extLst>
+              <a:ext uri="{FF2B5EF4-FFF2-40B4-BE49-F238E27FC236}">
+                <a16:creationId xmlns:a16="http://schemas.microsoft.com/office/drawing/2014/main" id="{5E7E5B21-9988-398A-E7FD-1AFC122CF26C}"/>
+              </a:ext>
+            </a:extLst>
+          </p:cNvPr>
+          <p:cNvSpPr>
+            <a:spLocks noGrp="1"/>
+          </p:cNvSpPr>
+          <p:nvPr>
+            <p:ph type="sldNum" sz="quarter" idx="12"/>
+          </p:nvPr>
+        </p:nvSpPr>
+        <p:spPr/>
+        <p:txBody>
+          <a:bodyPr/>
+          <a:lstStyle/>
+          <a:p>
+            <a:fld id="{B5CEABB6-07DC-46E8-9B57-56EC44A396E5}" type="slidenum">
+              <a:rPr lang="en-US" smtClean="0"/>
+              <a:pPr/>
+              <a:t>4</a:t>
+            </a:fld>
+            <a:endParaRPr lang="en-US" dirty="0"/>
+          </a:p>
+        </p:txBody>
+      </p:sp>
+    </p:spTree>
+    <p:extLst>
+      <p:ext uri="{BB962C8B-B14F-4D97-AF65-F5344CB8AC3E}">
+        <p14:creationId xmlns:p14="http://schemas.microsoft.com/office/powerpoint/2010/main" val="3264855741"/>
+      </p:ext>
+    </p:extLst>
+  </p:cSld>
+  <p:clrMapOvr>
+    <a:masterClrMapping/>
+  </p:clrMapOvr>
+</p:sld>
+</file>
+
+<file path=ppt/slides/slide5.xml><?xml version="1.0" encoding="utf-8"?>
 <p:sld xmlns:a="http://schemas.openxmlformats.org/drawingml/2006/main" xmlns:r="http://schemas.openxmlformats.org/officeDocument/2006/relationships" xmlns:p="http://schemas.openxmlformats.org/presentationml/2006/main">
   <p:cSld>
     <p:spTree>
@@ -21025,7 +21285,7 @@
             <a:fld id="{B5CEABB6-07DC-46E8-9B57-56EC44A396E5}" type="slidenum">
               <a:rPr lang="en-US" smtClean="0"/>
               <a:pPr/>
-              <a:t>4</a:t>
+              <a:t>5</a:t>
             </a:fld>
             <a:endParaRPr lang="en-US" dirty="0"/>
           </a:p>
@@ -21044,7 +21304,7 @@
 </p:sld>
 </file>
 
-<file path=ppt/slides/slide5.xml><?xml version="1.0" encoding="utf-8"?>
+<file path=ppt/slides/slide6.xml><?xml version="1.0" encoding="utf-8"?>
 <p:sld xmlns:a="http://schemas.openxmlformats.org/drawingml/2006/main" xmlns:r="http://schemas.openxmlformats.org/officeDocument/2006/relationships" xmlns:p="http://schemas.openxmlformats.org/presentationml/2006/main">
   <p:cSld>
     <p:spTree>
@@ -21163,7 +21423,7 @@
             <a:fld id="{B5CEABB6-07DC-46E8-9B57-56EC44A396E5}" type="slidenum">
               <a:rPr lang="en-US" smtClean="0"/>
               <a:pPr/>
-              <a:t>5</a:t>
+              <a:t>6</a:t>
             </a:fld>
             <a:endParaRPr lang="en-US" dirty="0"/>
           </a:p>
@@ -21229,7 +21489,7 @@
 </p:sld>
 </file>
 
-<file path=ppt/slides/slide6.xml><?xml version="1.0" encoding="utf-8"?>
+<file path=ppt/slides/slide7.xml><?xml version="1.0" encoding="utf-8"?>
 <p:sld xmlns:a="http://schemas.openxmlformats.org/drawingml/2006/main" xmlns:r="http://schemas.openxmlformats.org/officeDocument/2006/relationships" xmlns:p="http://schemas.openxmlformats.org/presentationml/2006/main">
   <p:cSld>
     <p:spTree>
@@ -21385,7 +21645,7 @@
 </p:sld>
 </file>
 
-<file path=ppt/slides/slide7.xml><?xml version="1.0" encoding="utf-8"?>
+<file path=ppt/slides/slide8.xml><?xml version="1.0" encoding="utf-8"?>
 <p:sld xmlns:a="http://schemas.openxmlformats.org/drawingml/2006/main" xmlns:r="http://schemas.openxmlformats.org/officeDocument/2006/relationships" xmlns:p="http://schemas.openxmlformats.org/presentationml/2006/main">
   <p:cSld>
     <p:spTree>
@@ -21535,7 +21795,7 @@
 </p:sld>
 </file>
 
-<file path=ppt/slides/slide8.xml><?xml version="1.0" encoding="utf-8"?>
+<file path=ppt/slides/slide9.xml><?xml version="1.0" encoding="utf-8"?>
 <p:sld xmlns:a="http://schemas.openxmlformats.org/drawingml/2006/main" xmlns:r="http://schemas.openxmlformats.org/officeDocument/2006/relationships" xmlns:p="http://schemas.openxmlformats.org/presentationml/2006/main">
   <p:cSld>
     <p:spTree>
@@ -21679,110 +21939,6 @@
     <p:extLst>
       <p:ext uri="{BB962C8B-B14F-4D97-AF65-F5344CB8AC3E}">
         <p14:creationId xmlns:p14="http://schemas.microsoft.com/office/powerpoint/2010/main" val="1213866251"/>
-      </p:ext>
-    </p:extLst>
-  </p:cSld>
-  <p:clrMapOvr>
-    <a:masterClrMapping/>
-  </p:clrMapOvr>
-</p:sld>
-</file>
-
-<file path=ppt/slides/slide9.xml><?xml version="1.0" encoding="utf-8"?>
-<p:sld xmlns:a="http://schemas.openxmlformats.org/drawingml/2006/main" xmlns:r="http://schemas.openxmlformats.org/officeDocument/2006/relationships" xmlns:p="http://schemas.openxmlformats.org/presentationml/2006/main">
-  <p:cSld>
-    <p:spTree>
-      <p:nvGrpSpPr>
-        <p:cNvPr id="1" name=""/>
-        <p:cNvGrpSpPr/>
-        <p:nvPr/>
-      </p:nvGrpSpPr>
-      <p:grpSpPr>
-        <a:xfrm>
-          <a:off x="0" y="0"/>
-          <a:ext cx="0" cy="0"/>
-          <a:chOff x="0" y="0"/>
-          <a:chExt cx="0" cy="0"/>
-        </a:xfrm>
-      </p:grpSpPr>
-      <p:sp>
-        <p:nvSpPr>
-          <p:cNvPr id="4" name="Title 3">
-            <a:extLst>
-              <a:ext uri="{FF2B5EF4-FFF2-40B4-BE49-F238E27FC236}">
-                <a16:creationId xmlns:a16="http://schemas.microsoft.com/office/drawing/2014/main" id="{D747612E-E853-BA2D-E681-3D6861E15FE0}"/>
-              </a:ext>
-            </a:extLst>
-          </p:cNvPr>
-          <p:cNvSpPr>
-            <a:spLocks noGrp="1"/>
-          </p:cNvSpPr>
-          <p:nvPr>
-            <p:ph type="title"/>
-          </p:nvPr>
-        </p:nvSpPr>
-        <p:spPr/>
-        <p:txBody>
-          <a:bodyPr/>
-          <a:lstStyle/>
-          <a:p>
-            <a:r>
-              <a:rPr lang="en-US" dirty="0"/>
-              <a:t>Machine Learning</a:t>
-            </a:r>
-          </a:p>
-        </p:txBody>
-      </p:sp>
-      <p:sp>
-        <p:nvSpPr>
-          <p:cNvPr id="5" name="Content Placeholder 4">
-            <a:extLst>
-              <a:ext uri="{FF2B5EF4-FFF2-40B4-BE49-F238E27FC236}">
-                <a16:creationId xmlns:a16="http://schemas.microsoft.com/office/drawing/2014/main" id="{09A8076E-0A6B-A573-3ECD-F35CB9B1DCA3}"/>
-              </a:ext>
-            </a:extLst>
-          </p:cNvPr>
-          <p:cNvSpPr>
-            <a:spLocks noGrp="1"/>
-          </p:cNvSpPr>
-          <p:nvPr>
-            <p:ph sz="half" idx="14"/>
-          </p:nvPr>
-        </p:nvSpPr>
-        <p:spPr/>
-        <p:txBody>
-          <a:bodyPr/>
-          <a:lstStyle/>
-          <a:p>
-            <a:r>
-              <a:rPr lang="en-US" dirty="0"/>
-              <a:t>Models Chosen:</a:t>
-            </a:r>
-          </a:p>
-          <a:p>
-            <a:r>
-              <a:rPr lang="en-US" dirty="0"/>
-              <a:t>Naïve Bayes</a:t>
-            </a:r>
-          </a:p>
-          <a:p>
-            <a:r>
-              <a:rPr lang="en-US" dirty="0"/>
-              <a:t>Decision Tree</a:t>
-            </a:r>
-          </a:p>
-          <a:p>
-            <a:r>
-              <a:rPr lang="en-US" dirty="0"/>
-              <a:t>	Untuned and Tuned</a:t>
-            </a:r>
-          </a:p>
-        </p:txBody>
-      </p:sp>
-    </p:spTree>
-    <p:extLst>
-      <p:ext uri="{BB962C8B-B14F-4D97-AF65-F5344CB8AC3E}">
-        <p14:creationId xmlns:p14="http://schemas.microsoft.com/office/powerpoint/2010/main" val="1077781537"/>
       </p:ext>
     </p:extLst>
   </p:cSld>
@@ -22584,12 +22740,23 @@
 </file>
 
 <file path=customXml/item1.xml><?xml version="1.0" encoding="utf-8"?>
-<?mso-contentType ?>
-<FormTemplates xmlns="http://schemas.microsoft.com/sharepoint/v3/contenttype/forms">
-  <Display>DocumentLibraryForm</Display>
-  <Edit>DocumentLibraryForm</Edit>
-  <New>DocumentLibraryForm</New>
-</FormTemplates>
+<p:properties xmlns:p="http://schemas.microsoft.com/office/2006/metadata/properties" xmlns:xsi="http://www.w3.org/2001/XMLSchema-instance" xmlns:pc="http://schemas.microsoft.com/office/infopath/2007/PartnerControls">
+  <documentManagement>
+    <Background xmlns="71af3243-3dd4-4a8d-8c0d-dd76da1f02a5">false</Background>
+    <Status xmlns="71af3243-3dd4-4a8d-8c0d-dd76da1f02a5">Not started</Status>
+    <_ip_UnifiedCompliancePolicyUIAction xmlns="http://schemas.microsoft.com/sharepoint/v3" xsi:nil="true"/>
+    <Image xmlns="71af3243-3dd4-4a8d-8c0d-dd76da1f02a5">
+      <Url xsi:nil="true"/>
+      <Description xsi:nil="true"/>
+    </Image>
+    <_ip_UnifiedCompliancePolicyProperties xmlns="http://schemas.microsoft.com/sharepoint/v3" xsi:nil="true"/>
+    <ImageTagsTaxHTField xmlns="71af3243-3dd4-4a8d-8c0d-dd76da1f02a5">
+      <Terms xmlns="http://schemas.microsoft.com/office/infopath/2007/PartnerControls"/>
+    </ImageTagsTaxHTField>
+    <TaxCatchAll xmlns="230e9df3-be65-4c73-a93b-d1236ebd677e" xsi:nil="true"/>
+    <MediaServiceKeyPoints xmlns="71af3243-3dd4-4a8d-8c0d-dd76da1f02a5" xsi:nil="true"/>
+  </documentManagement>
+</p:properties>
 </file>
 
 <file path=customXml/item2.xml><?xml version="1.0" encoding="utf-8"?>
@@ -22905,29 +23072,22 @@
 </file>
 
 <file path=customXml/item3.xml><?xml version="1.0" encoding="utf-8"?>
-<p:properties xmlns:p="http://schemas.microsoft.com/office/2006/metadata/properties" xmlns:xsi="http://www.w3.org/2001/XMLSchema-instance" xmlns:pc="http://schemas.microsoft.com/office/infopath/2007/PartnerControls">
-  <documentManagement>
-    <Background xmlns="71af3243-3dd4-4a8d-8c0d-dd76da1f02a5">false</Background>
-    <Status xmlns="71af3243-3dd4-4a8d-8c0d-dd76da1f02a5">Not started</Status>
-    <_ip_UnifiedCompliancePolicyUIAction xmlns="http://schemas.microsoft.com/sharepoint/v3" xsi:nil="true"/>
-    <Image xmlns="71af3243-3dd4-4a8d-8c0d-dd76da1f02a5">
-      <Url xsi:nil="true"/>
-      <Description xsi:nil="true"/>
-    </Image>
-    <_ip_UnifiedCompliancePolicyProperties xmlns="http://schemas.microsoft.com/sharepoint/v3" xsi:nil="true"/>
-    <ImageTagsTaxHTField xmlns="71af3243-3dd4-4a8d-8c0d-dd76da1f02a5">
-      <Terms xmlns="http://schemas.microsoft.com/office/infopath/2007/PartnerControls"/>
-    </ImageTagsTaxHTField>
-    <TaxCatchAll xmlns="230e9df3-be65-4c73-a93b-d1236ebd677e" xsi:nil="true"/>
-    <MediaServiceKeyPoints xmlns="71af3243-3dd4-4a8d-8c0d-dd76da1f02a5" xsi:nil="true"/>
-  </documentManagement>
-</p:properties>
+<?mso-contentType ?>
+<FormTemplates xmlns="http://schemas.microsoft.com/sharepoint/v3/contenttype/forms">
+  <Display>DocumentLibraryForm</Display>
+  <Edit>DocumentLibraryForm</Edit>
+  <New>DocumentLibraryForm</New>
+</FormTemplates>
 </file>
 
 <file path=customXml/itemProps1.xml><?xml version="1.0" encoding="utf-8"?>
-<ds:datastoreItem xmlns:ds="http://schemas.openxmlformats.org/officeDocument/2006/customXml" ds:itemID="{8451406B-581B-4C29-A833-E33D8A6AB075}">
+<ds:datastoreItem xmlns:ds="http://schemas.openxmlformats.org/officeDocument/2006/customXml" ds:itemID="{0F65614A-92F9-4391-AC3D-F3F5B0704F99}">
   <ds:schemaRefs>
-    <ds:schemaRef ds:uri="http://schemas.microsoft.com/sharepoint/v3/contenttype/forms"/>
+    <ds:schemaRef ds:uri="http://schemas.microsoft.com/office/2006/metadata/properties"/>
+    <ds:schemaRef ds:uri="http://schemas.microsoft.com/office/infopath/2007/PartnerControls"/>
+    <ds:schemaRef ds:uri="71af3243-3dd4-4a8d-8c0d-dd76da1f02a5"/>
+    <ds:schemaRef ds:uri="http://schemas.microsoft.com/sharepoint/v3"/>
+    <ds:schemaRef ds:uri="230e9df3-be65-4c73-a93b-d1236ebd677e"/>
   </ds:schemaRefs>
 </ds:datastoreItem>
 </file>
@@ -22954,13 +23114,9 @@
 </file>
 
 <file path=customXml/itemProps3.xml><?xml version="1.0" encoding="utf-8"?>
-<ds:datastoreItem xmlns:ds="http://schemas.openxmlformats.org/officeDocument/2006/customXml" ds:itemID="{0F65614A-92F9-4391-AC3D-F3F5B0704F99}">
+<ds:datastoreItem xmlns:ds="http://schemas.openxmlformats.org/officeDocument/2006/customXml" ds:itemID="{8451406B-581B-4C29-A833-E33D8A6AB075}">
   <ds:schemaRefs>
-    <ds:schemaRef ds:uri="http://schemas.microsoft.com/office/2006/metadata/properties"/>
-    <ds:schemaRef ds:uri="http://schemas.microsoft.com/office/infopath/2007/PartnerControls"/>
-    <ds:schemaRef ds:uri="71af3243-3dd4-4a8d-8c0d-dd76da1f02a5"/>
-    <ds:schemaRef ds:uri="http://schemas.microsoft.com/sharepoint/v3"/>
-    <ds:schemaRef ds:uri="230e9df3-be65-4c73-a93b-d1236ebd677e"/>
+    <ds:schemaRef ds:uri="http://schemas.microsoft.com/sharepoint/v3/contenttype/forms"/>
   </ds:schemaRefs>
 </ds:datastoreItem>
 </file>

</xml_diff>

<commit_message>
Final commit for project.
</commit_message>
<xml_diff>
--- a/Can you predict diabetes.pptx
+++ b/Can you predict diabetes.pptx
@@ -5,10 +5,10 @@
     <p:sldMasterId id="2147483648" r:id="rId4"/>
   </p:sldMasterIdLst>
   <p:notesMasterIdLst>
-    <p:notesMasterId r:id="rId18"/>
+    <p:notesMasterId r:id="rId21"/>
   </p:notesMasterIdLst>
   <p:handoutMasterIdLst>
-    <p:handoutMasterId r:id="rId19"/>
+    <p:handoutMasterId r:id="rId22"/>
   </p:handoutMasterIdLst>
   <p:sldIdLst>
     <p:sldId id="256" r:id="rId5"/>
@@ -22,8 +22,11 @@
     <p:sldId id="283" r:id="rId13"/>
     <p:sldId id="284" r:id="rId14"/>
     <p:sldId id="285" r:id="rId15"/>
-    <p:sldId id="286" r:id="rId16"/>
-    <p:sldId id="287" r:id="rId17"/>
+    <p:sldId id="289" r:id="rId16"/>
+    <p:sldId id="286" r:id="rId17"/>
+    <p:sldId id="287" r:id="rId18"/>
+    <p:sldId id="290" r:id="rId19"/>
+    <p:sldId id="291" r:id="rId20"/>
   </p:sldIdLst>
   <p:sldSz cx="12192000" cy="6858000"/>
   <p:notesSz cx="6858000" cy="9144000"/>
@@ -255,7 +258,7 @@
           <a:p>
             <a:fld id="{058ABBF3-49A8-4B3F-9773-22E67695BB12}" type="datetimeFigureOut">
               <a:rPr lang="en-US" smtClean="0"/>
-              <a:t>4/29/2025</a:t>
+              <a:t>4/30/2025</a:t>
             </a:fld>
             <a:endParaRPr lang="en-US" dirty="0"/>
           </a:p>
@@ -432,7 +435,7 @@
           <a:p>
             <a:fld id="{F44AAC2B-A50D-4386-849A-6B59FB991B4C}" type="datetimeFigureOut">
               <a:rPr lang="en-US" smtClean="0"/>
-              <a:t>4/29/2025</a:t>
+              <a:t>4/30/2025</a:t>
             </a:fld>
             <a:endParaRPr lang="en-US" dirty="0"/>
           </a:p>
@@ -20280,25 +20283,25 @@
           <a:p>
             <a:r>
               <a:rPr lang="en-US" dirty="0"/>
-              <a:t>Accuracy: 0.750</a:t>
+              <a:t>Accuracy: 0.758</a:t>
             </a:r>
           </a:p>
           <a:p>
             <a:r>
               <a:rPr lang="en-US" dirty="0"/>
-              <a:t>Precision: 0.642</a:t>
+              <a:t>Precision: 0.667</a:t>
             </a:r>
           </a:p>
           <a:p>
             <a:r>
               <a:rPr lang="en-US" dirty="0"/>
-              <a:t>Recall: 0.642</a:t>
+              <a:t>Recall: 0.545</a:t>
             </a:r>
           </a:p>
           <a:p>
             <a:r>
               <a:rPr lang="en-US" dirty="0"/>
-              <a:t>F1 Score: 0.642</a:t>
+              <a:t>F1 Score: 0.600</a:t>
             </a:r>
           </a:p>
         </p:txBody>
@@ -20335,10 +20338,10 @@
       </p:sp>
       <p:pic>
         <p:nvPicPr>
-          <p:cNvPr id="5123" name="Picture 3">
+          <p:cNvPr id="6146" name="Picture 2">
             <a:extLst>
               <a:ext uri="{FF2B5EF4-FFF2-40B4-BE49-F238E27FC236}">
-                <a16:creationId xmlns:a16="http://schemas.microsoft.com/office/drawing/2014/main" id="{021658AB-43BD-ED17-6E0D-F6388A4F1040}"/>
+                <a16:creationId xmlns:a16="http://schemas.microsoft.com/office/drawing/2014/main" id="{B23C480B-A8E8-CAA5-3F62-F1E053DFD365}"/>
               </a:ext>
             </a:extLst>
           </p:cNvPr>
@@ -20362,7 +20365,7 @@
         </p:blipFill>
         <p:spPr bwMode="auto">
           <a:xfrm>
-            <a:off x="190500" y="2074984"/>
+            <a:off x="190500" y="2105130"/>
             <a:ext cx="4743450" cy="4114800"/>
           </a:xfrm>
           <a:prstGeom prst="rect">
@@ -20394,6 +20397,211 @@
 </file>
 
 <file path=ppt/slides/slide12.xml><?xml version="1.0" encoding="utf-8"?>
+<p:sld xmlns:a="http://schemas.openxmlformats.org/drawingml/2006/main" xmlns:r="http://schemas.openxmlformats.org/officeDocument/2006/relationships" xmlns:p="http://schemas.openxmlformats.org/presentationml/2006/main">
+  <p:cSld>
+    <p:spTree>
+      <p:nvGrpSpPr>
+        <p:cNvPr id="1" name="">
+          <a:extLst>
+            <a:ext uri="{FF2B5EF4-FFF2-40B4-BE49-F238E27FC236}">
+              <a16:creationId xmlns:a16="http://schemas.microsoft.com/office/drawing/2014/main" id="{2D2750B4-0E69-FFE5-8F67-8A4687064C85}"/>
+            </a:ext>
+          </a:extLst>
+        </p:cNvPr>
+        <p:cNvGrpSpPr/>
+        <p:nvPr/>
+      </p:nvGrpSpPr>
+      <p:grpSpPr>
+        <a:xfrm>
+          <a:off x="0" y="0"/>
+          <a:ext cx="0" cy="0"/>
+          <a:chOff x="0" y="0"/>
+          <a:chExt cx="0" cy="0"/>
+        </a:xfrm>
+      </p:grpSpPr>
+      <p:sp>
+        <p:nvSpPr>
+          <p:cNvPr id="2" name="Title 1">
+            <a:extLst>
+              <a:ext uri="{FF2B5EF4-FFF2-40B4-BE49-F238E27FC236}">
+                <a16:creationId xmlns:a16="http://schemas.microsoft.com/office/drawing/2014/main" id="{BB70B932-26BD-A1CD-9A66-BBE0A62A7814}"/>
+              </a:ext>
+            </a:extLst>
+          </p:cNvPr>
+          <p:cNvSpPr>
+            <a:spLocks noGrp="1"/>
+          </p:cNvSpPr>
+          <p:nvPr>
+            <p:ph type="title"/>
+          </p:nvPr>
+        </p:nvSpPr>
+        <p:spPr/>
+        <p:txBody>
+          <a:bodyPr/>
+          <a:lstStyle/>
+          <a:p>
+            <a:r>
+              <a:rPr lang="en-US" dirty="0" err="1"/>
+              <a:t>SCALEd</a:t>
+            </a:r>
+            <a:r>
+              <a:rPr lang="en-US" dirty="0"/>
+              <a:t> Naïve Bayes</a:t>
+            </a:r>
+          </a:p>
+        </p:txBody>
+      </p:sp>
+      <p:sp>
+        <p:nvSpPr>
+          <p:cNvPr id="3" name="Content Placeholder 2">
+            <a:extLst>
+              <a:ext uri="{FF2B5EF4-FFF2-40B4-BE49-F238E27FC236}">
+                <a16:creationId xmlns:a16="http://schemas.microsoft.com/office/drawing/2014/main" id="{D0014E9D-1BC7-70DC-BA2A-525AE813DAFD}"/>
+              </a:ext>
+            </a:extLst>
+          </p:cNvPr>
+          <p:cNvSpPr>
+            <a:spLocks noGrp="1"/>
+          </p:cNvSpPr>
+          <p:nvPr>
+            <p:ph sz="half" idx="14"/>
+          </p:nvPr>
+        </p:nvSpPr>
+        <p:spPr/>
+        <p:txBody>
+          <a:bodyPr>
+            <a:normAutofit fontScale="92500" lnSpcReduction="20000"/>
+          </a:bodyPr>
+          <a:lstStyle/>
+          <a:p>
+            <a:r>
+              <a:rPr lang="en-US" dirty="0"/>
+              <a:t>Gaussian Naïve Bayes model was chosen</a:t>
+            </a:r>
+          </a:p>
+          <a:p>
+            <a:r>
+              <a:rPr lang="en-US" dirty="0"/>
+              <a:t>75/25 split used for training</a:t>
+            </a:r>
+          </a:p>
+          <a:p>
+            <a:r>
+              <a:rPr lang="en-US" dirty="0"/>
+              <a:t>Accuracy: 0.758</a:t>
+            </a:r>
+          </a:p>
+          <a:p>
+            <a:r>
+              <a:rPr lang="en-US" dirty="0"/>
+              <a:t>Precision: 0.667</a:t>
+            </a:r>
+          </a:p>
+          <a:p>
+            <a:r>
+              <a:rPr lang="en-US" dirty="0"/>
+              <a:t>Recall: 0.545</a:t>
+            </a:r>
+          </a:p>
+          <a:p>
+            <a:r>
+              <a:rPr lang="en-US" dirty="0"/>
+              <a:t>F1 Score: 0.600</a:t>
+            </a:r>
+          </a:p>
+        </p:txBody>
+      </p:sp>
+      <p:sp>
+        <p:nvSpPr>
+          <p:cNvPr id="4" name="Slide Number Placeholder 3">
+            <a:extLst>
+              <a:ext uri="{FF2B5EF4-FFF2-40B4-BE49-F238E27FC236}">
+                <a16:creationId xmlns:a16="http://schemas.microsoft.com/office/drawing/2014/main" id="{1FE2950D-7A93-C621-5D17-7828010E05C0}"/>
+              </a:ext>
+            </a:extLst>
+          </p:cNvPr>
+          <p:cNvSpPr>
+            <a:spLocks noGrp="1"/>
+          </p:cNvSpPr>
+          <p:nvPr>
+            <p:ph type="sldNum" sz="quarter" idx="12"/>
+          </p:nvPr>
+        </p:nvSpPr>
+        <p:spPr/>
+        <p:txBody>
+          <a:bodyPr/>
+          <a:lstStyle/>
+          <a:p>
+            <a:fld id="{B5CEABB6-07DC-46E8-9B57-56EC44A396E5}" type="slidenum">
+              <a:rPr lang="en-US" smtClean="0"/>
+              <a:pPr/>
+              <a:t>12</a:t>
+            </a:fld>
+            <a:endParaRPr lang="en-US" dirty="0"/>
+          </a:p>
+        </p:txBody>
+      </p:sp>
+      <p:pic>
+        <p:nvPicPr>
+          <p:cNvPr id="5123" name="Picture 3">
+            <a:extLst>
+              <a:ext uri="{FF2B5EF4-FFF2-40B4-BE49-F238E27FC236}">
+                <a16:creationId xmlns:a16="http://schemas.microsoft.com/office/drawing/2014/main" id="{DE2E494B-DD34-A324-A738-41F6DD70D97C}"/>
+              </a:ext>
+            </a:extLst>
+          </p:cNvPr>
+          <p:cNvPicPr>
+            <a:picLocks noChangeAspect="1" noChangeArrowheads="1"/>
+          </p:cNvPicPr>
+          <p:nvPr/>
+        </p:nvPicPr>
+        <p:blipFill>
+          <a:blip r:embed="rId2">
+            <a:extLst>
+              <a:ext uri="{28A0092B-C50C-407E-A947-70E740481C1C}">
+                <a14:useLocalDpi xmlns:a14="http://schemas.microsoft.com/office/drawing/2010/main" val="0"/>
+              </a:ext>
+            </a:extLst>
+          </a:blip>
+          <a:srcRect/>
+          <a:stretch>
+            <a:fillRect/>
+          </a:stretch>
+        </p:blipFill>
+        <p:spPr bwMode="auto">
+          <a:xfrm>
+            <a:off x="190500" y="2241550"/>
+            <a:ext cx="4743450" cy="4114800"/>
+          </a:xfrm>
+          <a:prstGeom prst="rect">
+            <a:avLst/>
+          </a:prstGeom>
+          <a:noFill/>
+          <a:extLst>
+            <a:ext uri="{909E8E84-426E-40DD-AFC4-6F175D3DCCD1}">
+              <a14:hiddenFill xmlns:a14="http://schemas.microsoft.com/office/drawing/2010/main">
+                <a:solidFill>
+                  <a:srgbClr val="FFFFFF"/>
+                </a:solidFill>
+              </a14:hiddenFill>
+            </a:ext>
+          </a:extLst>
+        </p:spPr>
+      </p:pic>
+    </p:spTree>
+    <p:extLst>
+      <p:ext uri="{BB962C8B-B14F-4D97-AF65-F5344CB8AC3E}">
+        <p14:creationId xmlns:p14="http://schemas.microsoft.com/office/powerpoint/2010/main" val="2812999804"/>
+      </p:ext>
+    </p:extLst>
+  </p:cSld>
+  <p:clrMapOvr>
+    <a:masterClrMapping/>
+  </p:clrMapOvr>
+</p:sld>
+</file>
+
+<file path=ppt/slides/slide13.xml><?xml version="1.0" encoding="utf-8"?>
 <p:sld xmlns:a="http://schemas.openxmlformats.org/drawingml/2006/main" xmlns:r="http://schemas.openxmlformats.org/officeDocument/2006/relationships" xmlns:p="http://schemas.openxmlformats.org/presentationml/2006/main">
   <p:cSld>
     <p:spTree>
@@ -20475,25 +20683,25 @@
           <a:p>
             <a:r>
               <a:rPr lang="en-US" dirty="0"/>
-              <a:t>Accuracy: 0.719</a:t>
+              <a:t>Accuracy: 0.707</a:t>
             </a:r>
           </a:p>
           <a:p>
             <a:r>
               <a:rPr lang="en-US" dirty="0"/>
-              <a:t>Precision: 0.562</a:t>
+              <a:t>Precision: 0.655</a:t>
             </a:r>
           </a:p>
           <a:p>
             <a:r>
               <a:rPr lang="en-US" dirty="0"/>
-              <a:t>Recall: 0.581</a:t>
+              <a:t>Recall: 0.500</a:t>
             </a:r>
           </a:p>
           <a:p>
             <a:r>
               <a:rPr lang="en-US" dirty="0"/>
-              <a:t>F1 Score: 0.571</a:t>
+              <a:t>F1 Score: 0.567</a:t>
             </a:r>
           </a:p>
         </p:txBody>
@@ -20522,7 +20730,7 @@
             <a:fld id="{B5CEABB6-07DC-46E8-9B57-56EC44A396E5}" type="slidenum">
               <a:rPr lang="en-US" smtClean="0"/>
               <a:pPr/>
-              <a:t>12</a:t>
+              <a:t>13</a:t>
             </a:fld>
             <a:endParaRPr lang="en-US" dirty="0"/>
           </a:p>
@@ -20530,10 +20738,10 @@
       </p:sp>
       <p:pic>
         <p:nvPicPr>
-          <p:cNvPr id="6146" name="Picture 2">
+          <p:cNvPr id="7171" name="Picture 3">
             <a:extLst>
               <a:ext uri="{FF2B5EF4-FFF2-40B4-BE49-F238E27FC236}">
-                <a16:creationId xmlns:a16="http://schemas.microsoft.com/office/drawing/2014/main" id="{1E8B8EDD-8A34-F3AA-A2FB-0EA6AF666089}"/>
+                <a16:creationId xmlns:a16="http://schemas.microsoft.com/office/drawing/2014/main" id="{06A06BED-6577-17F6-077E-C96292A19B2B}"/>
               </a:ext>
             </a:extLst>
           </p:cNvPr>
@@ -20557,8 +20765,8 @@
         </p:blipFill>
         <p:spPr bwMode="auto">
           <a:xfrm>
-            <a:off x="104775" y="2004646"/>
-            <a:ext cx="4829175" cy="4114800"/>
+            <a:off x="0" y="2095082"/>
+            <a:ext cx="4743450" cy="4114800"/>
           </a:xfrm>
           <a:prstGeom prst="rect">
             <a:avLst/>
@@ -20588,7 +20796,7 @@
 </p:sld>
 </file>
 
-<file path=ppt/slides/slide13.xml><?xml version="1.0" encoding="utf-8"?>
+<file path=ppt/slides/slide14.xml><?xml version="1.0" encoding="utf-8"?>
 <p:sld xmlns:a="http://schemas.openxmlformats.org/drawingml/2006/main" xmlns:r="http://schemas.openxmlformats.org/officeDocument/2006/relationships" xmlns:p="http://schemas.openxmlformats.org/presentationml/2006/main">
   <p:cSld>
     <p:spTree>
@@ -20634,7 +20842,7 @@
           <a:p>
             <a:r>
               <a:rPr lang="en-US" dirty="0"/>
-              <a:t>Decision Tree</a:t>
+              <a:t>Tuned Decision Tree</a:t>
             </a:r>
           </a:p>
         </p:txBody>
@@ -20658,19 +20866,13 @@
         <p:spPr/>
         <p:txBody>
           <a:bodyPr>
-            <a:normAutofit fontScale="92500" lnSpcReduction="20000"/>
+            <a:normAutofit lnSpcReduction="10000"/>
           </a:bodyPr>
           <a:lstStyle/>
           <a:p>
             <a:r>
               <a:rPr lang="en-US" dirty="0"/>
               <a:t>Variables were minmax scaled</a:t>
-            </a:r>
-          </a:p>
-          <a:p>
-            <a:r>
-              <a:rPr lang="en-US" dirty="0"/>
-              <a:t>Tuned</a:t>
             </a:r>
           </a:p>
           <a:p>
@@ -20723,7 +20925,125 @@
             <a:fld id="{B5CEABB6-07DC-46E8-9B57-56EC44A396E5}" type="slidenum">
               <a:rPr lang="en-US" smtClean="0"/>
               <a:pPr/>
-              <a:t>13</a:t>
+              <a:t>14</a:t>
+            </a:fld>
+            <a:endParaRPr lang="en-US" dirty="0"/>
+          </a:p>
+        </p:txBody>
+      </p:sp>
+    </p:spTree>
+    <p:extLst>
+      <p:ext uri="{BB962C8B-B14F-4D97-AF65-F5344CB8AC3E}">
+        <p14:creationId xmlns:p14="http://schemas.microsoft.com/office/powerpoint/2010/main" val="1286572266"/>
+      </p:ext>
+    </p:extLst>
+  </p:cSld>
+  <p:clrMapOvr>
+    <a:masterClrMapping/>
+  </p:clrMapOvr>
+</p:sld>
+</file>
+
+<file path=ppt/slides/slide15.xml><?xml version="1.0" encoding="utf-8"?>
+<p:sld xmlns:a="http://schemas.openxmlformats.org/drawingml/2006/main" xmlns:r="http://schemas.openxmlformats.org/officeDocument/2006/relationships" xmlns:p="http://schemas.openxmlformats.org/presentationml/2006/main">
+  <p:cSld>
+    <p:spTree>
+      <p:nvGrpSpPr>
+        <p:cNvPr id="1" name=""/>
+        <p:cNvGrpSpPr/>
+        <p:nvPr/>
+      </p:nvGrpSpPr>
+      <p:grpSpPr>
+        <a:xfrm>
+          <a:off x="0" y="0"/>
+          <a:ext cx="0" cy="0"/>
+          <a:chOff x="0" y="0"/>
+          <a:chExt cx="0" cy="0"/>
+        </a:xfrm>
+      </p:grpSpPr>
+      <p:sp>
+        <p:nvSpPr>
+          <p:cNvPr id="2" name="Title 1">
+            <a:extLst>
+              <a:ext uri="{FF2B5EF4-FFF2-40B4-BE49-F238E27FC236}">
+                <a16:creationId xmlns:a16="http://schemas.microsoft.com/office/drawing/2014/main" id="{C67104DE-28BF-8D82-9395-98BF284D651C}"/>
+              </a:ext>
+            </a:extLst>
+          </p:cNvPr>
+          <p:cNvSpPr>
+            <a:spLocks noGrp="1"/>
+          </p:cNvSpPr>
+          <p:nvPr>
+            <p:ph type="title"/>
+          </p:nvPr>
+        </p:nvSpPr>
+        <p:spPr>
+          <a:xfrm>
+            <a:off x="4933950" y="429461"/>
+            <a:ext cx="6343650" cy="1389291"/>
+          </a:xfrm>
+        </p:spPr>
+        <p:txBody>
+          <a:bodyPr/>
+          <a:lstStyle/>
+          <a:p>
+            <a:r>
+              <a:rPr lang="en-US" dirty="0"/>
+              <a:t>Best Performing Decision TREE</a:t>
+            </a:r>
+          </a:p>
+        </p:txBody>
+      </p:sp>
+      <p:sp>
+        <p:nvSpPr>
+          <p:cNvPr id="3" name="Content Placeholder 2">
+            <a:extLst>
+              <a:ext uri="{FF2B5EF4-FFF2-40B4-BE49-F238E27FC236}">
+                <a16:creationId xmlns:a16="http://schemas.microsoft.com/office/drawing/2014/main" id="{A50A7D50-3FE4-D782-7712-B53BF1B67F32}"/>
+              </a:ext>
+            </a:extLst>
+          </p:cNvPr>
+          <p:cNvSpPr>
+            <a:spLocks noGrp="1"/>
+          </p:cNvSpPr>
+          <p:nvPr>
+            <p:ph sz="half" idx="14"/>
+          </p:nvPr>
+        </p:nvSpPr>
+        <p:spPr/>
+        <p:txBody>
+          <a:bodyPr/>
+          <a:lstStyle/>
+          <a:p>
+            <a:endParaRPr lang="en-US"/>
+          </a:p>
+        </p:txBody>
+      </p:sp>
+      <p:sp>
+        <p:nvSpPr>
+          <p:cNvPr id="4" name="Slide Number Placeholder 3">
+            <a:extLst>
+              <a:ext uri="{FF2B5EF4-FFF2-40B4-BE49-F238E27FC236}">
+                <a16:creationId xmlns:a16="http://schemas.microsoft.com/office/drawing/2014/main" id="{25E26A1C-872B-9C0B-5195-120978F5D35D}"/>
+              </a:ext>
+            </a:extLst>
+          </p:cNvPr>
+          <p:cNvSpPr>
+            <a:spLocks noGrp="1"/>
+          </p:cNvSpPr>
+          <p:nvPr>
+            <p:ph type="sldNum" sz="quarter" idx="12"/>
+          </p:nvPr>
+        </p:nvSpPr>
+        <p:spPr/>
+        <p:txBody>
+          <a:bodyPr/>
+          <a:lstStyle/>
+          <a:p>
+            <a:fld id="{B5CEABB6-07DC-46E8-9B57-56EC44A396E5}" type="slidenum">
+              <a:rPr lang="en-US" smtClean="0"/>
+              <a:pPr/>
+              <a:t>15</a:t>
             </a:fld>
             <a:endParaRPr lang="en-US" dirty="0"/>
           </a:p>
@@ -20731,10 +21051,10 @@
       </p:sp>
       <p:pic>
         <p:nvPicPr>
-          <p:cNvPr id="6146" name="Picture 2">
+          <p:cNvPr id="9218" name="Picture 2">
             <a:extLst>
               <a:ext uri="{FF2B5EF4-FFF2-40B4-BE49-F238E27FC236}">
-                <a16:creationId xmlns:a16="http://schemas.microsoft.com/office/drawing/2014/main" id="{D9C6375E-7190-F736-1176-37FCFDD27FA0}"/>
+                <a16:creationId xmlns:a16="http://schemas.microsoft.com/office/drawing/2014/main" id="{442BB027-FEB4-0146-1CA3-75D0FC6165D3}"/>
               </a:ext>
             </a:extLst>
           </p:cNvPr>
@@ -20758,8 +21078,8 @@
         </p:blipFill>
         <p:spPr bwMode="auto">
           <a:xfrm>
-            <a:off x="104775" y="2004646"/>
-            <a:ext cx="4829175" cy="4114800"/>
+            <a:off x="4933950" y="1818752"/>
+            <a:ext cx="7038712" cy="4232044"/>
           </a:xfrm>
           <a:prstGeom prst="rect">
             <a:avLst/>
@@ -20779,7 +21099,129 @@
     </p:spTree>
     <p:extLst>
       <p:ext uri="{BB962C8B-B14F-4D97-AF65-F5344CB8AC3E}">
-        <p14:creationId xmlns:p14="http://schemas.microsoft.com/office/powerpoint/2010/main" val="1286572266"/>
+        <p14:creationId xmlns:p14="http://schemas.microsoft.com/office/powerpoint/2010/main" val="352327461"/>
+      </p:ext>
+    </p:extLst>
+  </p:cSld>
+  <p:clrMapOvr>
+    <a:masterClrMapping/>
+  </p:clrMapOvr>
+</p:sld>
+</file>
+
+<file path=ppt/slides/slide16.xml><?xml version="1.0" encoding="utf-8"?>
+<p:sld xmlns:a="http://schemas.openxmlformats.org/drawingml/2006/main" xmlns:r="http://schemas.openxmlformats.org/officeDocument/2006/relationships" xmlns:p="http://schemas.openxmlformats.org/presentationml/2006/main">
+  <p:cSld>
+    <p:spTree>
+      <p:nvGrpSpPr>
+        <p:cNvPr id="1" name=""/>
+        <p:cNvGrpSpPr/>
+        <p:nvPr/>
+      </p:nvGrpSpPr>
+      <p:grpSpPr>
+        <a:xfrm>
+          <a:off x="0" y="0"/>
+          <a:ext cx="0" cy="0"/>
+          <a:chOff x="0" y="0"/>
+          <a:chExt cx="0" cy="0"/>
+        </a:xfrm>
+      </p:grpSpPr>
+      <p:sp>
+        <p:nvSpPr>
+          <p:cNvPr id="2" name="Title 1">
+            <a:extLst>
+              <a:ext uri="{FF2B5EF4-FFF2-40B4-BE49-F238E27FC236}">
+                <a16:creationId xmlns:a16="http://schemas.microsoft.com/office/drawing/2014/main" id="{77C19FB8-6E52-2FE9-EA9E-08FCDD9C4AF8}"/>
+              </a:ext>
+            </a:extLst>
+          </p:cNvPr>
+          <p:cNvSpPr>
+            <a:spLocks noGrp="1"/>
+          </p:cNvSpPr>
+          <p:nvPr>
+            <p:ph type="title"/>
+          </p:nvPr>
+        </p:nvSpPr>
+        <p:spPr/>
+        <p:txBody>
+          <a:bodyPr/>
+          <a:lstStyle/>
+          <a:p>
+            <a:r>
+              <a:rPr lang="en-US" dirty="0"/>
+              <a:t>Conclusion</a:t>
+            </a:r>
+          </a:p>
+        </p:txBody>
+      </p:sp>
+      <p:sp>
+        <p:nvSpPr>
+          <p:cNvPr id="3" name="Content Placeholder 2">
+            <a:extLst>
+              <a:ext uri="{FF2B5EF4-FFF2-40B4-BE49-F238E27FC236}">
+                <a16:creationId xmlns:a16="http://schemas.microsoft.com/office/drawing/2014/main" id="{530C6894-F7B8-9137-4E58-E850EAD6E4C7}"/>
+              </a:ext>
+            </a:extLst>
+          </p:cNvPr>
+          <p:cNvSpPr>
+            <a:spLocks noGrp="1"/>
+          </p:cNvSpPr>
+          <p:nvPr>
+            <p:ph sz="half" idx="14"/>
+          </p:nvPr>
+        </p:nvSpPr>
+        <p:spPr/>
+        <p:txBody>
+          <a:bodyPr/>
+          <a:lstStyle/>
+          <a:p>
+            <a:r>
+              <a:rPr lang="en-US" dirty="0"/>
+              <a:t>Utilizing ML to accurately predict diabetes diagnoses can be demonstrated.</a:t>
+            </a:r>
+          </a:p>
+          <a:p>
+            <a:r>
+              <a:rPr lang="en-US" dirty="0"/>
+              <a:t>A larger dataset might have resulted in a better performing set of models. </a:t>
+            </a:r>
+          </a:p>
+        </p:txBody>
+      </p:sp>
+      <p:sp>
+        <p:nvSpPr>
+          <p:cNvPr id="4" name="Slide Number Placeholder 3">
+            <a:extLst>
+              <a:ext uri="{FF2B5EF4-FFF2-40B4-BE49-F238E27FC236}">
+                <a16:creationId xmlns:a16="http://schemas.microsoft.com/office/drawing/2014/main" id="{524F74C7-6BC5-8374-6382-92F5B1A86E77}"/>
+              </a:ext>
+            </a:extLst>
+          </p:cNvPr>
+          <p:cNvSpPr>
+            <a:spLocks noGrp="1"/>
+          </p:cNvSpPr>
+          <p:nvPr>
+            <p:ph type="sldNum" sz="quarter" idx="12"/>
+          </p:nvPr>
+        </p:nvSpPr>
+        <p:spPr/>
+        <p:txBody>
+          <a:bodyPr/>
+          <a:lstStyle/>
+          <a:p>
+            <a:fld id="{B5CEABB6-07DC-46E8-9B57-56EC44A396E5}" type="slidenum">
+              <a:rPr lang="en-US" smtClean="0"/>
+              <a:pPr/>
+              <a:t>16</a:t>
+            </a:fld>
+            <a:endParaRPr lang="en-US" dirty="0"/>
+          </a:p>
+        </p:txBody>
+      </p:sp>
+    </p:spTree>
+    <p:extLst>
+      <p:ext uri="{BB962C8B-B14F-4D97-AF65-F5344CB8AC3E}">
+        <p14:creationId xmlns:p14="http://schemas.microsoft.com/office/powerpoint/2010/main" val="459224426"/>
       </p:ext>
     </p:extLst>
   </p:cSld>
@@ -21431,10 +21873,10 @@
       </p:sp>
       <p:pic>
         <p:nvPicPr>
-          <p:cNvPr id="1026" name="Picture 2">
+          <p:cNvPr id="2" name="Picture 2">
             <a:extLst>
               <a:ext uri="{FF2B5EF4-FFF2-40B4-BE49-F238E27FC236}">
-                <a16:creationId xmlns:a16="http://schemas.microsoft.com/office/drawing/2014/main" id="{2D85E377-EA9D-4D33-25D7-E41FC79502F0}"/>
+                <a16:creationId xmlns:a16="http://schemas.microsoft.com/office/drawing/2014/main" id="{955DB4E9-DF39-DC58-5348-57C5B60E8C0E}"/>
               </a:ext>
             </a:extLst>
           </p:cNvPr>
@@ -21458,8 +21900,8 @@
         </p:blipFill>
         <p:spPr bwMode="auto">
           <a:xfrm>
-            <a:off x="4682969" y="761322"/>
-            <a:ext cx="7175756" cy="5428943"/>
+            <a:off x="4391497" y="419693"/>
+            <a:ext cx="7679284" cy="6119219"/>
           </a:xfrm>
           <a:prstGeom prst="rect">
             <a:avLst/>
@@ -21587,10 +22029,10 @@
       </p:sp>
       <p:pic>
         <p:nvPicPr>
-          <p:cNvPr id="2054" name="Picture 6">
+          <p:cNvPr id="2052" name="Picture 4">
             <a:extLst>
               <a:ext uri="{FF2B5EF4-FFF2-40B4-BE49-F238E27FC236}">
-                <a16:creationId xmlns:a16="http://schemas.microsoft.com/office/drawing/2014/main" id="{828FE8A6-518E-AB79-6EBE-76D813BD0736}"/>
+                <a16:creationId xmlns:a16="http://schemas.microsoft.com/office/drawing/2014/main" id="{876DE79B-4ED5-089D-F363-F2AEEF7F35A2}"/>
               </a:ext>
             </a:extLst>
           </p:cNvPr>
@@ -21614,8 +22056,8 @@
         </p:blipFill>
         <p:spPr bwMode="auto">
           <a:xfrm>
-            <a:off x="4244366" y="488440"/>
-            <a:ext cx="7773423" cy="5881119"/>
+            <a:off x="4323825" y="407954"/>
+            <a:ext cx="7749671" cy="6274200"/>
           </a:xfrm>
           <a:prstGeom prst="rect">
             <a:avLst/>
@@ -21737,10 +22179,10 @@
       </p:sp>
       <p:pic>
         <p:nvPicPr>
-          <p:cNvPr id="3074" name="Picture 2">
+          <p:cNvPr id="4" name="Picture 2">
             <a:extLst>
               <a:ext uri="{FF2B5EF4-FFF2-40B4-BE49-F238E27FC236}">
-                <a16:creationId xmlns:a16="http://schemas.microsoft.com/office/drawing/2014/main" id="{01676131-5363-C9CC-ACAC-B56D6F938E99}"/>
+                <a16:creationId xmlns:a16="http://schemas.microsoft.com/office/drawing/2014/main" id="{B6B3990B-C3E9-51B4-29A5-CEED21D1476E}"/>
               </a:ext>
             </a:extLst>
           </p:cNvPr>
@@ -21764,8 +22206,8 @@
         </p:blipFill>
         <p:spPr bwMode="auto">
           <a:xfrm>
-            <a:off x="4566557" y="660357"/>
-            <a:ext cx="7280502" cy="5537283"/>
+            <a:off x="4350681" y="468244"/>
+            <a:ext cx="7530402" cy="6096678"/>
           </a:xfrm>
           <a:prstGeom prst="rect">
             <a:avLst/>
@@ -21833,7 +22275,7 @@
           <a:bodyPr/>
           <a:lstStyle/>
           <a:p>
-            <a:endParaRPr lang="en-US"/>
+            <a:endParaRPr lang="en-US" dirty="0"/>
           </a:p>
         </p:txBody>
       </p:sp>
@@ -21890,10 +22332,10 @@
       </p:sp>
       <p:pic>
         <p:nvPicPr>
-          <p:cNvPr id="4098" name="Picture 2">
+          <p:cNvPr id="4" name="Picture 2">
             <a:extLst>
               <a:ext uri="{FF2B5EF4-FFF2-40B4-BE49-F238E27FC236}">
-                <a16:creationId xmlns:a16="http://schemas.microsoft.com/office/drawing/2014/main" id="{47B728F3-0709-F3D9-2649-38A3662FAF2E}"/>
+                <a16:creationId xmlns:a16="http://schemas.microsoft.com/office/drawing/2014/main" id="{8E18D041-08F1-48F9-18A2-B47858F5A440}"/>
               </a:ext>
             </a:extLst>
           </p:cNvPr>
@@ -21917,8 +22359,8 @@
         </p:blipFill>
         <p:spPr bwMode="auto">
           <a:xfrm>
-            <a:off x="5024612" y="73069"/>
-            <a:ext cx="6711862" cy="6711862"/>
+            <a:off x="4946772" y="0"/>
+            <a:ext cx="6722850" cy="7103063"/>
           </a:xfrm>
           <a:prstGeom prst="rect">
             <a:avLst/>
@@ -22740,23 +23182,12 @@
 </file>
 
 <file path=customXml/item1.xml><?xml version="1.0" encoding="utf-8"?>
-<p:properties xmlns:p="http://schemas.microsoft.com/office/2006/metadata/properties" xmlns:xsi="http://www.w3.org/2001/XMLSchema-instance" xmlns:pc="http://schemas.microsoft.com/office/infopath/2007/PartnerControls">
-  <documentManagement>
-    <Background xmlns="71af3243-3dd4-4a8d-8c0d-dd76da1f02a5">false</Background>
-    <Status xmlns="71af3243-3dd4-4a8d-8c0d-dd76da1f02a5">Not started</Status>
-    <_ip_UnifiedCompliancePolicyUIAction xmlns="http://schemas.microsoft.com/sharepoint/v3" xsi:nil="true"/>
-    <Image xmlns="71af3243-3dd4-4a8d-8c0d-dd76da1f02a5">
-      <Url xsi:nil="true"/>
-      <Description xsi:nil="true"/>
-    </Image>
-    <_ip_UnifiedCompliancePolicyProperties xmlns="http://schemas.microsoft.com/sharepoint/v3" xsi:nil="true"/>
-    <ImageTagsTaxHTField xmlns="71af3243-3dd4-4a8d-8c0d-dd76da1f02a5">
-      <Terms xmlns="http://schemas.microsoft.com/office/infopath/2007/PartnerControls"/>
-    </ImageTagsTaxHTField>
-    <TaxCatchAll xmlns="230e9df3-be65-4c73-a93b-d1236ebd677e" xsi:nil="true"/>
-    <MediaServiceKeyPoints xmlns="71af3243-3dd4-4a8d-8c0d-dd76da1f02a5" xsi:nil="true"/>
-  </documentManagement>
-</p:properties>
+<?mso-contentType ?>
+<FormTemplates xmlns="http://schemas.microsoft.com/sharepoint/v3/contenttype/forms">
+  <Display>DocumentLibraryForm</Display>
+  <Edit>DocumentLibraryForm</Edit>
+  <New>DocumentLibraryForm</New>
+</FormTemplates>
 </file>
 
 <file path=customXml/item2.xml><?xml version="1.0" encoding="utf-8"?>
@@ -23072,22 +23503,29 @@
 </file>
 
 <file path=customXml/item3.xml><?xml version="1.0" encoding="utf-8"?>
-<?mso-contentType ?>
-<FormTemplates xmlns="http://schemas.microsoft.com/sharepoint/v3/contenttype/forms">
-  <Display>DocumentLibraryForm</Display>
-  <Edit>DocumentLibraryForm</Edit>
-  <New>DocumentLibraryForm</New>
-</FormTemplates>
+<p:properties xmlns:p="http://schemas.microsoft.com/office/2006/metadata/properties" xmlns:xsi="http://www.w3.org/2001/XMLSchema-instance" xmlns:pc="http://schemas.microsoft.com/office/infopath/2007/PartnerControls">
+  <documentManagement>
+    <Background xmlns="71af3243-3dd4-4a8d-8c0d-dd76da1f02a5">false</Background>
+    <Status xmlns="71af3243-3dd4-4a8d-8c0d-dd76da1f02a5">Not started</Status>
+    <_ip_UnifiedCompliancePolicyUIAction xmlns="http://schemas.microsoft.com/sharepoint/v3" xsi:nil="true"/>
+    <Image xmlns="71af3243-3dd4-4a8d-8c0d-dd76da1f02a5">
+      <Url xsi:nil="true"/>
+      <Description xsi:nil="true"/>
+    </Image>
+    <_ip_UnifiedCompliancePolicyProperties xmlns="http://schemas.microsoft.com/sharepoint/v3" xsi:nil="true"/>
+    <ImageTagsTaxHTField xmlns="71af3243-3dd4-4a8d-8c0d-dd76da1f02a5">
+      <Terms xmlns="http://schemas.microsoft.com/office/infopath/2007/PartnerControls"/>
+    </ImageTagsTaxHTField>
+    <TaxCatchAll xmlns="230e9df3-be65-4c73-a93b-d1236ebd677e" xsi:nil="true"/>
+    <MediaServiceKeyPoints xmlns="71af3243-3dd4-4a8d-8c0d-dd76da1f02a5" xsi:nil="true"/>
+  </documentManagement>
+</p:properties>
 </file>
 
 <file path=customXml/itemProps1.xml><?xml version="1.0" encoding="utf-8"?>
-<ds:datastoreItem xmlns:ds="http://schemas.openxmlformats.org/officeDocument/2006/customXml" ds:itemID="{0F65614A-92F9-4391-AC3D-F3F5B0704F99}">
+<ds:datastoreItem xmlns:ds="http://schemas.openxmlformats.org/officeDocument/2006/customXml" ds:itemID="{8451406B-581B-4C29-A833-E33D8A6AB075}">
   <ds:schemaRefs>
-    <ds:schemaRef ds:uri="http://schemas.microsoft.com/office/2006/metadata/properties"/>
-    <ds:schemaRef ds:uri="http://schemas.microsoft.com/office/infopath/2007/PartnerControls"/>
-    <ds:schemaRef ds:uri="71af3243-3dd4-4a8d-8c0d-dd76da1f02a5"/>
-    <ds:schemaRef ds:uri="http://schemas.microsoft.com/sharepoint/v3"/>
-    <ds:schemaRef ds:uri="230e9df3-be65-4c73-a93b-d1236ebd677e"/>
+    <ds:schemaRef ds:uri="http://schemas.microsoft.com/sharepoint/v3/contenttype/forms"/>
   </ds:schemaRefs>
 </ds:datastoreItem>
 </file>
@@ -23114,9 +23552,13 @@
 </file>
 
 <file path=customXml/itemProps3.xml><?xml version="1.0" encoding="utf-8"?>
-<ds:datastoreItem xmlns:ds="http://schemas.openxmlformats.org/officeDocument/2006/customXml" ds:itemID="{8451406B-581B-4C29-A833-E33D8A6AB075}">
+<ds:datastoreItem xmlns:ds="http://schemas.openxmlformats.org/officeDocument/2006/customXml" ds:itemID="{0F65614A-92F9-4391-AC3D-F3F5B0704F99}">
   <ds:schemaRefs>
-    <ds:schemaRef ds:uri="http://schemas.microsoft.com/sharepoint/v3/contenttype/forms"/>
+    <ds:schemaRef ds:uri="http://schemas.microsoft.com/office/2006/metadata/properties"/>
+    <ds:schemaRef ds:uri="http://schemas.microsoft.com/office/infopath/2007/PartnerControls"/>
+    <ds:schemaRef ds:uri="71af3243-3dd4-4a8d-8c0d-dd76da1f02a5"/>
+    <ds:schemaRef ds:uri="http://schemas.microsoft.com/sharepoint/v3"/>
+    <ds:schemaRef ds:uri="230e9df3-be65-4c73-a93b-d1236ebd677e"/>
   </ds:schemaRefs>
 </ds:datastoreItem>
 </file>

</xml_diff>